<commit_message>
update to sites bcg
</commit_message>
<xml_diff>
--- a/circles.pptx
+++ b/circles.pptx
@@ -288,7 +288,7 @@
           <a:p>
             <a:fld id="{FDC9D6A7-3973-D34C-8133-287BD86AE431}" type="datetimeFigureOut">
               <a:rPr lang="en-US" smtClean="0"/>
-              <a:t>12/19/18</a:t>
+              <a:t>12/22/18</a:t>
             </a:fld>
             <a:endParaRPr lang="en-US"/>
           </a:p>
@@ -458,7 +458,7 @@
           <a:p>
             <a:fld id="{FDC9D6A7-3973-D34C-8133-287BD86AE431}" type="datetimeFigureOut">
               <a:rPr lang="en-US" smtClean="0"/>
-              <a:t>12/19/18</a:t>
+              <a:t>12/22/18</a:t>
             </a:fld>
             <a:endParaRPr lang="en-US"/>
           </a:p>
@@ -638,7 +638,7 @@
           <a:p>
             <a:fld id="{FDC9D6A7-3973-D34C-8133-287BD86AE431}" type="datetimeFigureOut">
               <a:rPr lang="en-US" smtClean="0"/>
-              <a:t>12/19/18</a:t>
+              <a:t>12/22/18</a:t>
             </a:fld>
             <a:endParaRPr lang="en-US"/>
           </a:p>
@@ -808,7 +808,7 @@
           <a:p>
             <a:fld id="{FDC9D6A7-3973-D34C-8133-287BD86AE431}" type="datetimeFigureOut">
               <a:rPr lang="en-US" smtClean="0"/>
-              <a:t>12/19/18</a:t>
+              <a:t>12/22/18</a:t>
             </a:fld>
             <a:endParaRPr lang="en-US"/>
           </a:p>
@@ -1054,7 +1054,7 @@
           <a:p>
             <a:fld id="{FDC9D6A7-3973-D34C-8133-287BD86AE431}" type="datetimeFigureOut">
               <a:rPr lang="en-US" smtClean="0"/>
-              <a:t>12/19/18</a:t>
+              <a:t>12/22/18</a:t>
             </a:fld>
             <a:endParaRPr lang="en-US"/>
           </a:p>
@@ -1342,7 +1342,7 @@
           <a:p>
             <a:fld id="{FDC9D6A7-3973-D34C-8133-287BD86AE431}" type="datetimeFigureOut">
               <a:rPr lang="en-US" smtClean="0"/>
-              <a:t>12/19/18</a:t>
+              <a:t>12/22/18</a:t>
             </a:fld>
             <a:endParaRPr lang="en-US"/>
           </a:p>
@@ -1764,7 +1764,7 @@
           <a:p>
             <a:fld id="{FDC9D6A7-3973-D34C-8133-287BD86AE431}" type="datetimeFigureOut">
               <a:rPr lang="en-US" smtClean="0"/>
-              <a:t>12/19/18</a:t>
+              <a:t>12/22/18</a:t>
             </a:fld>
             <a:endParaRPr lang="en-US"/>
           </a:p>
@@ -1882,7 +1882,7 @@
           <a:p>
             <a:fld id="{FDC9D6A7-3973-D34C-8133-287BD86AE431}" type="datetimeFigureOut">
               <a:rPr lang="en-US" smtClean="0"/>
-              <a:t>12/19/18</a:t>
+              <a:t>12/22/18</a:t>
             </a:fld>
             <a:endParaRPr lang="en-US"/>
           </a:p>
@@ -1977,7 +1977,7 @@
           <a:p>
             <a:fld id="{FDC9D6A7-3973-D34C-8133-287BD86AE431}" type="datetimeFigureOut">
               <a:rPr lang="en-US" smtClean="0"/>
-              <a:t>12/19/18</a:t>
+              <a:t>12/22/18</a:t>
             </a:fld>
             <a:endParaRPr lang="en-US"/>
           </a:p>
@@ -2254,7 +2254,7 @@
           <a:p>
             <a:fld id="{FDC9D6A7-3973-D34C-8133-287BD86AE431}" type="datetimeFigureOut">
               <a:rPr lang="en-US" smtClean="0"/>
-              <a:t>12/19/18</a:t>
+              <a:t>12/22/18</a:t>
             </a:fld>
             <a:endParaRPr lang="en-US"/>
           </a:p>
@@ -2507,7 +2507,7 @@
           <a:p>
             <a:fld id="{FDC9D6A7-3973-D34C-8133-287BD86AE431}" type="datetimeFigureOut">
               <a:rPr lang="en-US" smtClean="0"/>
-              <a:t>12/19/18</a:t>
+              <a:t>12/22/18</a:t>
             </a:fld>
             <a:endParaRPr lang="en-US"/>
           </a:p>
@@ -2720,7 +2720,7 @@
           <a:p>
             <a:fld id="{FDC9D6A7-3973-D34C-8133-287BD86AE431}" type="datetimeFigureOut">
               <a:rPr lang="en-US" smtClean="0"/>
-              <a:t>12/19/18</a:t>
+              <a:t>12/22/18</a:t>
             </a:fld>
             <a:endParaRPr lang="en-US"/>
           </a:p>
@@ -3095,306 +3095,351 @@
           <a:chExt cx="0" cy="0"/>
         </a:xfrm>
       </p:grpSpPr>
-      <p:sp>
-        <p:nvSpPr>
-          <p:cNvPr id="4" name="Pie 3"/>
-          <p:cNvSpPr/>
+      <p:grpSp>
+        <p:nvGrpSpPr>
+          <p:cNvPr id="2" name="Group 1"/>
+          <p:cNvGrpSpPr/>
           <p:nvPr/>
-        </p:nvSpPr>
-        <p:spPr>
+        </p:nvGrpSpPr>
+        <p:grpSpPr>
           <a:xfrm>
-            <a:off x="1899128" y="1851749"/>
+            <a:off x="929233" y="1680350"/>
             <a:ext cx="685800" cy="685800"/>
+            <a:chOff x="1891354" y="1851749"/>
+            <a:chExt cx="693574" cy="685800"/>
           </a:xfrm>
-          <a:prstGeom prst="pie">
-            <a:avLst>
-              <a:gd name="adj1" fmla="val 5438467"/>
-              <a:gd name="adj2" fmla="val 16200000"/>
-            </a:avLst>
-          </a:prstGeom>
-          <a:solidFill>
-            <a:srgbClr val="0000FF"/>
-          </a:solidFill>
-          <a:ln>
-            <a:noFill/>
-          </a:ln>
-          <a:effectLst/>
-        </p:spPr>
-        <p:style>
-          <a:lnRef idx="1">
-            <a:schemeClr val="accent1"/>
-          </a:lnRef>
-          <a:fillRef idx="3">
-            <a:schemeClr val="accent1"/>
-          </a:fillRef>
-          <a:effectRef idx="2">
-            <a:schemeClr val="accent1"/>
-          </a:effectRef>
-          <a:fontRef idx="minor">
-            <a:schemeClr val="lt1"/>
-          </a:fontRef>
-        </p:style>
-        <p:txBody>
-          <a:bodyPr rtlCol="0" anchor="ctr"/>
-          <a:lstStyle/>
-          <a:p>
-            <a:pPr algn="ctr"/>
-            <a:endParaRPr lang="en-US"/>
-          </a:p>
-        </p:txBody>
-      </p:sp>
-      <p:sp>
-        <p:nvSpPr>
-          <p:cNvPr id="8" name="Pie 7"/>
-          <p:cNvSpPr/>
+        </p:grpSpPr>
+        <p:sp>
+          <p:nvSpPr>
+            <p:cNvPr id="4" name="Pie 3"/>
+            <p:cNvSpPr/>
+            <p:nvPr/>
+          </p:nvSpPr>
+          <p:spPr>
+            <a:xfrm>
+              <a:off x="1899128" y="1851749"/>
+              <a:ext cx="685800" cy="685800"/>
+            </a:xfrm>
+            <a:prstGeom prst="pie">
+              <a:avLst>
+                <a:gd name="adj1" fmla="val 5438467"/>
+                <a:gd name="adj2" fmla="val 16200000"/>
+              </a:avLst>
+            </a:prstGeom>
+            <a:solidFill>
+              <a:srgbClr val="0000FF"/>
+            </a:solidFill>
+            <a:ln>
+              <a:noFill/>
+            </a:ln>
+            <a:effectLst/>
+          </p:spPr>
+          <p:style>
+            <a:lnRef idx="1">
+              <a:schemeClr val="accent1"/>
+            </a:lnRef>
+            <a:fillRef idx="3">
+              <a:schemeClr val="accent1"/>
+            </a:fillRef>
+            <a:effectRef idx="2">
+              <a:schemeClr val="accent1"/>
+            </a:effectRef>
+            <a:fontRef idx="minor">
+              <a:schemeClr val="lt1"/>
+            </a:fontRef>
+          </p:style>
+          <p:txBody>
+            <a:bodyPr rtlCol="0" anchor="ctr"/>
+            <a:lstStyle/>
+            <a:p>
+              <a:pPr algn="ctr"/>
+              <a:endParaRPr lang="en-US"/>
+            </a:p>
+          </p:txBody>
+        </p:sp>
+        <p:sp>
+          <p:nvSpPr>
+            <p:cNvPr id="8" name="Pie 7"/>
+            <p:cNvSpPr/>
+            <p:nvPr/>
+          </p:nvSpPr>
+          <p:spPr>
+            <a:xfrm>
+              <a:off x="1891354" y="1851749"/>
+              <a:ext cx="685800" cy="685800"/>
+            </a:xfrm>
+            <a:prstGeom prst="pie">
+              <a:avLst>
+                <a:gd name="adj1" fmla="val 16212808"/>
+                <a:gd name="adj2" fmla="val 5458127"/>
+              </a:avLst>
+            </a:prstGeom>
+            <a:solidFill>
+              <a:srgbClr val="0000FF"/>
+            </a:solidFill>
+            <a:ln>
+              <a:noFill/>
+            </a:ln>
+            <a:effectLst/>
+          </p:spPr>
+          <p:style>
+            <a:lnRef idx="1">
+              <a:schemeClr val="accent1"/>
+            </a:lnRef>
+            <a:fillRef idx="3">
+              <a:schemeClr val="accent1"/>
+            </a:fillRef>
+            <a:effectRef idx="2">
+              <a:schemeClr val="accent1"/>
+            </a:effectRef>
+            <a:fontRef idx="minor">
+              <a:schemeClr val="lt1"/>
+            </a:fontRef>
+          </p:style>
+          <p:txBody>
+            <a:bodyPr rtlCol="0" anchor="ctr"/>
+            <a:lstStyle/>
+            <a:p>
+              <a:pPr algn="ctr"/>
+              <a:endParaRPr lang="en-US">
+                <a:solidFill>
+                  <a:schemeClr val="tx1"/>
+                </a:solidFill>
+              </a:endParaRPr>
+            </a:p>
+          </p:txBody>
+        </p:sp>
+      </p:grpSp>
+      <p:grpSp>
+        <p:nvGrpSpPr>
+          <p:cNvPr id="3" name="Group 2"/>
+          <p:cNvGrpSpPr/>
           <p:nvPr/>
-        </p:nvSpPr>
-        <p:spPr>
+        </p:nvGrpSpPr>
+        <p:grpSpPr>
           <a:xfrm>
-            <a:off x="2577154" y="1851749"/>
+            <a:off x="1906557" y="1680350"/>
             <a:ext cx="685800" cy="685800"/>
+            <a:chOff x="1891354" y="2709050"/>
+            <a:chExt cx="693574" cy="685800"/>
           </a:xfrm>
-          <a:prstGeom prst="pie">
-            <a:avLst>
-              <a:gd name="adj1" fmla="val 16212808"/>
-              <a:gd name="adj2" fmla="val 5458127"/>
-            </a:avLst>
-          </a:prstGeom>
-          <a:solidFill>
-            <a:srgbClr val="0000FF"/>
-          </a:solidFill>
-          <a:ln>
-            <a:noFill/>
-          </a:ln>
-          <a:effectLst/>
-        </p:spPr>
-        <p:style>
-          <a:lnRef idx="1">
-            <a:schemeClr val="accent1"/>
-          </a:lnRef>
-          <a:fillRef idx="3">
-            <a:schemeClr val="accent1"/>
-          </a:fillRef>
-          <a:effectRef idx="2">
-            <a:schemeClr val="accent1"/>
-          </a:effectRef>
-          <a:fontRef idx="minor">
-            <a:schemeClr val="lt1"/>
-          </a:fontRef>
-        </p:style>
-        <p:txBody>
-          <a:bodyPr rtlCol="0" anchor="ctr"/>
-          <a:lstStyle/>
-          <a:p>
-            <a:pPr algn="ctr"/>
-            <a:endParaRPr lang="en-US">
-              <a:solidFill>
-                <a:schemeClr val="tx1"/>
-              </a:solidFill>
-            </a:endParaRPr>
-          </a:p>
-        </p:txBody>
-      </p:sp>
-      <p:sp>
-        <p:nvSpPr>
-          <p:cNvPr id="9" name="Pie 8"/>
-          <p:cNvSpPr/>
+        </p:grpSpPr>
+        <p:sp>
+          <p:nvSpPr>
+            <p:cNvPr id="9" name="Pie 8"/>
+            <p:cNvSpPr/>
+            <p:nvPr/>
+          </p:nvSpPr>
+          <p:spPr>
+            <a:xfrm>
+              <a:off x="1899128" y="2709050"/>
+              <a:ext cx="685800" cy="685800"/>
+            </a:xfrm>
+            <a:prstGeom prst="pie">
+              <a:avLst>
+                <a:gd name="adj1" fmla="val 5438467"/>
+                <a:gd name="adj2" fmla="val 16200000"/>
+              </a:avLst>
+            </a:prstGeom>
+            <a:solidFill>
+              <a:srgbClr val="FF0000"/>
+            </a:solidFill>
+            <a:ln>
+              <a:noFill/>
+            </a:ln>
+            <a:effectLst/>
+          </p:spPr>
+          <p:style>
+            <a:lnRef idx="1">
+              <a:schemeClr val="accent1"/>
+            </a:lnRef>
+            <a:fillRef idx="3">
+              <a:schemeClr val="accent1"/>
+            </a:fillRef>
+            <a:effectRef idx="2">
+              <a:schemeClr val="accent1"/>
+            </a:effectRef>
+            <a:fontRef idx="minor">
+              <a:schemeClr val="lt1"/>
+            </a:fontRef>
+          </p:style>
+          <p:txBody>
+            <a:bodyPr rtlCol="0" anchor="ctr"/>
+            <a:lstStyle/>
+            <a:p>
+              <a:pPr algn="ctr"/>
+              <a:endParaRPr lang="en-US"/>
+            </a:p>
+          </p:txBody>
+        </p:sp>
+        <p:sp>
+          <p:nvSpPr>
+            <p:cNvPr id="10" name="Pie 9"/>
+            <p:cNvSpPr/>
+            <p:nvPr/>
+          </p:nvSpPr>
+          <p:spPr>
+            <a:xfrm>
+              <a:off x="1891354" y="2709050"/>
+              <a:ext cx="685800" cy="685800"/>
+            </a:xfrm>
+            <a:prstGeom prst="pie">
+              <a:avLst>
+                <a:gd name="adj1" fmla="val 16212808"/>
+                <a:gd name="adj2" fmla="val 5458127"/>
+              </a:avLst>
+            </a:prstGeom>
+            <a:solidFill>
+              <a:srgbClr val="FF0000"/>
+            </a:solidFill>
+            <a:ln>
+              <a:noFill/>
+            </a:ln>
+            <a:effectLst/>
+          </p:spPr>
+          <p:style>
+            <a:lnRef idx="1">
+              <a:schemeClr val="accent1"/>
+            </a:lnRef>
+            <a:fillRef idx="3">
+              <a:schemeClr val="accent1"/>
+            </a:fillRef>
+            <a:effectRef idx="2">
+              <a:schemeClr val="accent1"/>
+            </a:effectRef>
+            <a:fontRef idx="minor">
+              <a:schemeClr val="lt1"/>
+            </a:fontRef>
+          </p:style>
+          <p:txBody>
+            <a:bodyPr rtlCol="0" anchor="ctr"/>
+            <a:lstStyle/>
+            <a:p>
+              <a:pPr algn="ctr"/>
+              <a:endParaRPr lang="en-US">
+                <a:solidFill>
+                  <a:schemeClr val="tx1"/>
+                </a:solidFill>
+              </a:endParaRPr>
+            </a:p>
+          </p:txBody>
+        </p:sp>
+      </p:grpSp>
+      <p:grpSp>
+        <p:nvGrpSpPr>
+          <p:cNvPr id="5" name="Group 4"/>
+          <p:cNvGrpSpPr/>
           <p:nvPr/>
-        </p:nvSpPr>
-        <p:spPr>
+        </p:nvGrpSpPr>
+        <p:grpSpPr>
           <a:xfrm>
-            <a:off x="1899128" y="2709050"/>
+            <a:off x="2872795" y="1680350"/>
             <a:ext cx="685800" cy="685800"/>
+            <a:chOff x="1891354" y="3766755"/>
+            <a:chExt cx="701348" cy="685800"/>
           </a:xfrm>
-          <a:prstGeom prst="pie">
-            <a:avLst>
-              <a:gd name="adj1" fmla="val 5438467"/>
-              <a:gd name="adj2" fmla="val 16200000"/>
-            </a:avLst>
-          </a:prstGeom>
-          <a:solidFill>
-            <a:srgbClr val="FF0000"/>
-          </a:solidFill>
-          <a:ln>
-            <a:noFill/>
-          </a:ln>
-          <a:effectLst/>
-        </p:spPr>
-        <p:style>
-          <a:lnRef idx="1">
-            <a:schemeClr val="accent1"/>
-          </a:lnRef>
-          <a:fillRef idx="3">
-            <a:schemeClr val="accent1"/>
-          </a:fillRef>
-          <a:effectRef idx="2">
-            <a:schemeClr val="accent1"/>
-          </a:effectRef>
-          <a:fontRef idx="minor">
-            <a:schemeClr val="lt1"/>
-          </a:fontRef>
-        </p:style>
-        <p:txBody>
-          <a:bodyPr rtlCol="0" anchor="ctr"/>
-          <a:lstStyle/>
-          <a:p>
-            <a:pPr algn="ctr"/>
-            <a:endParaRPr lang="en-US"/>
-          </a:p>
-        </p:txBody>
-      </p:sp>
-      <p:sp>
-        <p:nvSpPr>
-          <p:cNvPr id="10" name="Pie 9"/>
-          <p:cNvSpPr/>
-          <p:nvPr/>
-        </p:nvSpPr>
-        <p:spPr>
-          <a:xfrm>
-            <a:off x="2577154" y="2709050"/>
-            <a:ext cx="685800" cy="685800"/>
-          </a:xfrm>
-          <a:prstGeom prst="pie">
-            <a:avLst>
-              <a:gd name="adj1" fmla="val 16212808"/>
-              <a:gd name="adj2" fmla="val 5458127"/>
-            </a:avLst>
-          </a:prstGeom>
-          <a:solidFill>
-            <a:srgbClr val="FF0000"/>
-          </a:solidFill>
-          <a:ln>
-            <a:noFill/>
-          </a:ln>
-          <a:effectLst/>
-        </p:spPr>
-        <p:style>
-          <a:lnRef idx="1">
-            <a:schemeClr val="accent1"/>
-          </a:lnRef>
-          <a:fillRef idx="3">
-            <a:schemeClr val="accent1"/>
-          </a:fillRef>
-          <a:effectRef idx="2">
-            <a:schemeClr val="accent1"/>
-          </a:effectRef>
-          <a:fontRef idx="minor">
-            <a:schemeClr val="lt1"/>
-          </a:fontRef>
-        </p:style>
-        <p:txBody>
-          <a:bodyPr rtlCol="0" anchor="ctr"/>
-          <a:lstStyle/>
-          <a:p>
-            <a:pPr algn="ctr"/>
-            <a:endParaRPr lang="en-US">
-              <a:solidFill>
-                <a:schemeClr val="tx1"/>
-              </a:solidFill>
-            </a:endParaRPr>
-          </a:p>
-        </p:txBody>
-      </p:sp>
-      <p:sp>
-        <p:nvSpPr>
-          <p:cNvPr id="11" name="Pie 10"/>
-          <p:cNvSpPr/>
-          <p:nvPr/>
-        </p:nvSpPr>
-        <p:spPr>
-          <a:xfrm>
-            <a:off x="1906902" y="3766755"/>
-            <a:ext cx="685800" cy="685800"/>
-          </a:xfrm>
-          <a:prstGeom prst="pie">
-            <a:avLst>
-              <a:gd name="adj1" fmla="val 5438467"/>
-              <a:gd name="adj2" fmla="val 16200000"/>
-            </a:avLst>
-          </a:prstGeom>
-          <a:solidFill>
-            <a:srgbClr val="800080"/>
-          </a:solidFill>
-          <a:ln>
-            <a:noFill/>
-          </a:ln>
-          <a:effectLst/>
-        </p:spPr>
-        <p:style>
-          <a:lnRef idx="1">
-            <a:schemeClr val="accent1"/>
-          </a:lnRef>
-          <a:fillRef idx="3">
-            <a:schemeClr val="accent1"/>
-          </a:fillRef>
-          <a:effectRef idx="2">
-            <a:schemeClr val="accent1"/>
-          </a:effectRef>
-          <a:fontRef idx="minor">
-            <a:schemeClr val="lt1"/>
-          </a:fontRef>
-        </p:style>
-        <p:txBody>
-          <a:bodyPr rtlCol="0" anchor="ctr"/>
-          <a:lstStyle/>
-          <a:p>
-            <a:pPr algn="ctr"/>
-            <a:endParaRPr lang="en-US"/>
-          </a:p>
-        </p:txBody>
-      </p:sp>
-      <p:sp>
-        <p:nvSpPr>
-          <p:cNvPr id="12" name="Pie 11"/>
-          <p:cNvSpPr/>
-          <p:nvPr/>
-        </p:nvSpPr>
-        <p:spPr>
-          <a:xfrm>
-            <a:off x="2584928" y="3766755"/>
-            <a:ext cx="685800" cy="685800"/>
-          </a:xfrm>
-          <a:prstGeom prst="pie">
-            <a:avLst>
-              <a:gd name="adj1" fmla="val 16212808"/>
-              <a:gd name="adj2" fmla="val 5458127"/>
-            </a:avLst>
-          </a:prstGeom>
-          <a:solidFill>
-            <a:srgbClr val="800080"/>
-          </a:solidFill>
-          <a:ln>
-            <a:noFill/>
-          </a:ln>
-          <a:effectLst/>
-        </p:spPr>
-        <p:style>
-          <a:lnRef idx="1">
-            <a:schemeClr val="accent1"/>
-          </a:lnRef>
-          <a:fillRef idx="3">
-            <a:schemeClr val="accent1"/>
-          </a:fillRef>
-          <a:effectRef idx="2">
-            <a:schemeClr val="accent1"/>
-          </a:effectRef>
-          <a:fontRef idx="minor">
-            <a:schemeClr val="lt1"/>
-          </a:fontRef>
-        </p:style>
-        <p:txBody>
-          <a:bodyPr rtlCol="0" anchor="ctr"/>
-          <a:lstStyle/>
-          <a:p>
-            <a:pPr algn="ctr"/>
-            <a:endParaRPr lang="en-US">
-              <a:solidFill>
-                <a:schemeClr val="tx1"/>
-              </a:solidFill>
-            </a:endParaRPr>
-          </a:p>
-        </p:txBody>
-      </p:sp>
+        </p:grpSpPr>
+        <p:sp>
+          <p:nvSpPr>
+            <p:cNvPr id="11" name="Pie 10"/>
+            <p:cNvSpPr/>
+            <p:nvPr/>
+          </p:nvSpPr>
+          <p:spPr>
+            <a:xfrm>
+              <a:off x="1906902" y="3766755"/>
+              <a:ext cx="685800" cy="685800"/>
+            </a:xfrm>
+            <a:prstGeom prst="pie">
+              <a:avLst>
+                <a:gd name="adj1" fmla="val 5438467"/>
+                <a:gd name="adj2" fmla="val 16200000"/>
+              </a:avLst>
+            </a:prstGeom>
+            <a:solidFill>
+              <a:srgbClr val="800080"/>
+            </a:solidFill>
+            <a:ln>
+              <a:noFill/>
+            </a:ln>
+            <a:effectLst/>
+          </p:spPr>
+          <p:style>
+            <a:lnRef idx="1">
+              <a:schemeClr val="accent1"/>
+            </a:lnRef>
+            <a:fillRef idx="3">
+              <a:schemeClr val="accent1"/>
+            </a:fillRef>
+            <a:effectRef idx="2">
+              <a:schemeClr val="accent1"/>
+            </a:effectRef>
+            <a:fontRef idx="minor">
+              <a:schemeClr val="lt1"/>
+            </a:fontRef>
+          </p:style>
+          <p:txBody>
+            <a:bodyPr rtlCol="0" anchor="ctr"/>
+            <a:lstStyle/>
+            <a:p>
+              <a:pPr algn="ctr"/>
+              <a:endParaRPr lang="en-US"/>
+            </a:p>
+          </p:txBody>
+        </p:sp>
+        <p:sp>
+          <p:nvSpPr>
+            <p:cNvPr id="12" name="Pie 11"/>
+            <p:cNvSpPr/>
+            <p:nvPr/>
+          </p:nvSpPr>
+          <p:spPr>
+            <a:xfrm>
+              <a:off x="1891354" y="3766755"/>
+              <a:ext cx="685800" cy="685800"/>
+            </a:xfrm>
+            <a:prstGeom prst="pie">
+              <a:avLst>
+                <a:gd name="adj1" fmla="val 16212808"/>
+                <a:gd name="adj2" fmla="val 5458127"/>
+              </a:avLst>
+            </a:prstGeom>
+            <a:solidFill>
+              <a:srgbClr val="800080"/>
+            </a:solidFill>
+            <a:ln>
+              <a:noFill/>
+            </a:ln>
+            <a:effectLst/>
+          </p:spPr>
+          <p:style>
+            <a:lnRef idx="1">
+              <a:schemeClr val="accent1"/>
+            </a:lnRef>
+            <a:fillRef idx="3">
+              <a:schemeClr val="accent1"/>
+            </a:fillRef>
+            <a:effectRef idx="2">
+              <a:schemeClr val="accent1"/>
+            </a:effectRef>
+            <a:fontRef idx="minor">
+              <a:schemeClr val="lt1"/>
+            </a:fontRef>
+          </p:style>
+          <p:txBody>
+            <a:bodyPr rtlCol="0" anchor="ctr"/>
+            <a:lstStyle/>
+            <a:p>
+              <a:pPr algn="ctr"/>
+              <a:endParaRPr lang="en-US">
+                <a:solidFill>
+                  <a:schemeClr val="tx1"/>
+                </a:solidFill>
+              </a:endParaRPr>
+            </a:p>
+          </p:txBody>
+        </p:sp>
+      </p:grpSp>
       <p:sp>
         <p:nvSpPr>
           <p:cNvPr id="13" name="Oval 12"/>
@@ -3440,6 +3485,696 @@
           </a:p>
         </p:txBody>
       </p:sp>
+      <p:grpSp>
+        <p:nvGrpSpPr>
+          <p:cNvPr id="6" name="Group 5"/>
+          <p:cNvGrpSpPr/>
+          <p:nvPr/>
+        </p:nvGrpSpPr>
+        <p:grpSpPr>
+          <a:xfrm>
+            <a:off x="936920" y="2670282"/>
+            <a:ext cx="685800" cy="685800"/>
+            <a:chOff x="3558595" y="2347049"/>
+            <a:chExt cx="685800" cy="685800"/>
+          </a:xfrm>
+        </p:grpSpPr>
+        <p:sp>
+          <p:nvSpPr>
+            <p:cNvPr id="16" name="Pie 15"/>
+            <p:cNvSpPr/>
+            <p:nvPr/>
+          </p:nvSpPr>
+          <p:spPr>
+            <a:xfrm>
+              <a:off x="3558595" y="2347049"/>
+              <a:ext cx="685800" cy="685800"/>
+            </a:xfrm>
+            <a:prstGeom prst="pie">
+              <a:avLst>
+                <a:gd name="adj1" fmla="val 5438467"/>
+                <a:gd name="adj2" fmla="val 16200000"/>
+              </a:avLst>
+            </a:prstGeom>
+            <a:solidFill>
+              <a:srgbClr val="0000FF"/>
+            </a:solidFill>
+            <a:ln>
+              <a:noFill/>
+            </a:ln>
+            <a:effectLst/>
+          </p:spPr>
+          <p:style>
+            <a:lnRef idx="1">
+              <a:schemeClr val="accent1"/>
+            </a:lnRef>
+            <a:fillRef idx="3">
+              <a:schemeClr val="accent1"/>
+            </a:fillRef>
+            <a:effectRef idx="2">
+              <a:schemeClr val="accent1"/>
+            </a:effectRef>
+            <a:fontRef idx="minor">
+              <a:schemeClr val="lt1"/>
+            </a:fontRef>
+          </p:style>
+          <p:txBody>
+            <a:bodyPr rtlCol="0" anchor="ctr"/>
+            <a:lstStyle/>
+            <a:p>
+              <a:pPr algn="ctr"/>
+              <a:endParaRPr lang="en-US"/>
+            </a:p>
+          </p:txBody>
+        </p:sp>
+        <p:sp>
+          <p:nvSpPr>
+            <p:cNvPr id="17" name="Pie 16"/>
+            <p:cNvSpPr/>
+            <p:nvPr/>
+          </p:nvSpPr>
+          <p:spPr>
+            <a:xfrm>
+              <a:off x="3558595" y="2347049"/>
+              <a:ext cx="685800" cy="685800"/>
+            </a:xfrm>
+            <a:prstGeom prst="pie">
+              <a:avLst>
+                <a:gd name="adj1" fmla="val 16212808"/>
+                <a:gd name="adj2" fmla="val 5458127"/>
+              </a:avLst>
+            </a:prstGeom>
+            <a:solidFill>
+              <a:srgbClr val="FF0000"/>
+            </a:solidFill>
+            <a:ln>
+              <a:noFill/>
+            </a:ln>
+            <a:effectLst/>
+          </p:spPr>
+          <p:style>
+            <a:lnRef idx="1">
+              <a:schemeClr val="accent1"/>
+            </a:lnRef>
+            <a:fillRef idx="3">
+              <a:schemeClr val="accent1"/>
+            </a:fillRef>
+            <a:effectRef idx="2">
+              <a:schemeClr val="accent1"/>
+            </a:effectRef>
+            <a:fontRef idx="minor">
+              <a:schemeClr val="lt1"/>
+            </a:fontRef>
+          </p:style>
+          <p:txBody>
+            <a:bodyPr rtlCol="0" anchor="ctr"/>
+            <a:lstStyle/>
+            <a:p>
+              <a:pPr algn="ctr"/>
+              <a:endParaRPr lang="en-US">
+                <a:solidFill>
+                  <a:schemeClr val="tx1"/>
+                </a:solidFill>
+              </a:endParaRPr>
+            </a:p>
+          </p:txBody>
+        </p:sp>
+      </p:grpSp>
+      <p:grpSp>
+        <p:nvGrpSpPr>
+          <p:cNvPr id="7" name="Group 6"/>
+          <p:cNvGrpSpPr/>
+          <p:nvPr/>
+        </p:nvGrpSpPr>
+        <p:grpSpPr>
+          <a:xfrm>
+            <a:off x="921546" y="3501210"/>
+            <a:ext cx="685800" cy="685800"/>
+            <a:chOff x="3558595" y="3251058"/>
+            <a:chExt cx="685800" cy="685800"/>
+          </a:xfrm>
+        </p:grpSpPr>
+        <p:sp>
+          <p:nvSpPr>
+            <p:cNvPr id="15" name="Pie 14"/>
+            <p:cNvSpPr/>
+            <p:nvPr/>
+          </p:nvSpPr>
+          <p:spPr>
+            <a:xfrm>
+              <a:off x="3558595" y="3251058"/>
+              <a:ext cx="685800" cy="685800"/>
+            </a:xfrm>
+            <a:prstGeom prst="pie">
+              <a:avLst>
+                <a:gd name="adj1" fmla="val 5438467"/>
+                <a:gd name="adj2" fmla="val 16200000"/>
+              </a:avLst>
+            </a:prstGeom>
+            <a:solidFill>
+              <a:srgbClr val="0000FF"/>
+            </a:solidFill>
+            <a:ln>
+              <a:noFill/>
+            </a:ln>
+            <a:effectLst/>
+          </p:spPr>
+          <p:style>
+            <a:lnRef idx="1">
+              <a:schemeClr val="accent1"/>
+            </a:lnRef>
+            <a:fillRef idx="3">
+              <a:schemeClr val="accent1"/>
+            </a:fillRef>
+            <a:effectRef idx="2">
+              <a:schemeClr val="accent1"/>
+            </a:effectRef>
+            <a:fontRef idx="minor">
+              <a:schemeClr val="lt1"/>
+            </a:fontRef>
+          </p:style>
+          <p:txBody>
+            <a:bodyPr rtlCol="0" anchor="ctr"/>
+            <a:lstStyle/>
+            <a:p>
+              <a:pPr algn="ctr"/>
+              <a:endParaRPr lang="en-US"/>
+            </a:p>
+          </p:txBody>
+        </p:sp>
+        <p:sp>
+          <p:nvSpPr>
+            <p:cNvPr id="18" name="Pie 17"/>
+            <p:cNvSpPr/>
+            <p:nvPr/>
+          </p:nvSpPr>
+          <p:spPr>
+            <a:xfrm>
+              <a:off x="3558595" y="3251058"/>
+              <a:ext cx="685800" cy="685800"/>
+            </a:xfrm>
+            <a:prstGeom prst="pie">
+              <a:avLst>
+                <a:gd name="adj1" fmla="val 16212808"/>
+                <a:gd name="adj2" fmla="val 5458127"/>
+              </a:avLst>
+            </a:prstGeom>
+            <a:solidFill>
+              <a:srgbClr val="800080"/>
+            </a:solidFill>
+            <a:ln>
+              <a:noFill/>
+            </a:ln>
+            <a:effectLst/>
+          </p:spPr>
+          <p:style>
+            <a:lnRef idx="1">
+              <a:schemeClr val="accent1"/>
+            </a:lnRef>
+            <a:fillRef idx="3">
+              <a:schemeClr val="accent1"/>
+            </a:fillRef>
+            <a:effectRef idx="2">
+              <a:schemeClr val="accent1"/>
+            </a:effectRef>
+            <a:fontRef idx="minor">
+              <a:schemeClr val="lt1"/>
+            </a:fontRef>
+          </p:style>
+          <p:txBody>
+            <a:bodyPr rtlCol="0" anchor="ctr"/>
+            <a:lstStyle/>
+            <a:p>
+              <a:pPr algn="ctr"/>
+              <a:endParaRPr lang="en-US">
+                <a:solidFill>
+                  <a:schemeClr val="tx1"/>
+                </a:solidFill>
+              </a:endParaRPr>
+            </a:p>
+          </p:txBody>
+        </p:sp>
+      </p:grpSp>
+      <p:grpSp>
+        <p:nvGrpSpPr>
+          <p:cNvPr id="27" name="Group 26"/>
+          <p:cNvGrpSpPr/>
+          <p:nvPr/>
+        </p:nvGrpSpPr>
+        <p:grpSpPr>
+          <a:xfrm>
+            <a:off x="1876151" y="2670282"/>
+            <a:ext cx="685800" cy="685800"/>
+            <a:chOff x="5692117" y="2366150"/>
+            <a:chExt cx="685800" cy="685800"/>
+          </a:xfrm>
+        </p:grpSpPr>
+        <p:sp>
+          <p:nvSpPr>
+            <p:cNvPr id="14" name="Pie 13"/>
+            <p:cNvSpPr/>
+            <p:nvPr/>
+          </p:nvSpPr>
+          <p:spPr>
+            <a:xfrm>
+              <a:off x="5692117" y="2366150"/>
+              <a:ext cx="685800" cy="685800"/>
+            </a:xfrm>
+            <a:prstGeom prst="pie">
+              <a:avLst>
+                <a:gd name="adj1" fmla="val 16212808"/>
+                <a:gd name="adj2" fmla="val 5458127"/>
+              </a:avLst>
+            </a:prstGeom>
+            <a:solidFill>
+              <a:srgbClr val="0000FF"/>
+            </a:solidFill>
+            <a:ln>
+              <a:noFill/>
+            </a:ln>
+            <a:effectLst/>
+          </p:spPr>
+          <p:style>
+            <a:lnRef idx="1">
+              <a:schemeClr val="accent1"/>
+            </a:lnRef>
+            <a:fillRef idx="3">
+              <a:schemeClr val="accent1"/>
+            </a:fillRef>
+            <a:effectRef idx="2">
+              <a:schemeClr val="accent1"/>
+            </a:effectRef>
+            <a:fontRef idx="minor">
+              <a:schemeClr val="lt1"/>
+            </a:fontRef>
+          </p:style>
+          <p:txBody>
+            <a:bodyPr rtlCol="0" anchor="ctr"/>
+            <a:lstStyle/>
+            <a:p>
+              <a:pPr algn="ctr"/>
+              <a:endParaRPr lang="en-US">
+                <a:solidFill>
+                  <a:schemeClr val="tx1"/>
+                </a:solidFill>
+              </a:endParaRPr>
+            </a:p>
+          </p:txBody>
+        </p:sp>
+        <p:sp>
+          <p:nvSpPr>
+            <p:cNvPr id="19" name="Pie 18"/>
+            <p:cNvSpPr/>
+            <p:nvPr/>
+          </p:nvSpPr>
+          <p:spPr>
+            <a:xfrm>
+              <a:off x="5692117" y="2366150"/>
+              <a:ext cx="685800" cy="685800"/>
+            </a:xfrm>
+            <a:prstGeom prst="pie">
+              <a:avLst>
+                <a:gd name="adj1" fmla="val 5438467"/>
+                <a:gd name="adj2" fmla="val 16200000"/>
+              </a:avLst>
+            </a:prstGeom>
+            <a:solidFill>
+              <a:srgbClr val="FF0000"/>
+            </a:solidFill>
+            <a:ln>
+              <a:noFill/>
+            </a:ln>
+            <a:effectLst/>
+          </p:spPr>
+          <p:style>
+            <a:lnRef idx="1">
+              <a:schemeClr val="accent1"/>
+            </a:lnRef>
+            <a:fillRef idx="3">
+              <a:schemeClr val="accent1"/>
+            </a:fillRef>
+            <a:effectRef idx="2">
+              <a:schemeClr val="accent1"/>
+            </a:effectRef>
+            <a:fontRef idx="minor">
+              <a:schemeClr val="lt1"/>
+            </a:fontRef>
+          </p:style>
+          <p:txBody>
+            <a:bodyPr rtlCol="0" anchor="ctr"/>
+            <a:lstStyle/>
+            <a:p>
+              <a:pPr algn="ctr"/>
+              <a:endParaRPr lang="en-US"/>
+            </a:p>
+          </p:txBody>
+        </p:sp>
+      </p:grpSp>
+      <p:grpSp>
+        <p:nvGrpSpPr>
+          <p:cNvPr id="28" name="Group 27"/>
+          <p:cNvGrpSpPr/>
+          <p:nvPr/>
+        </p:nvGrpSpPr>
+        <p:grpSpPr>
+          <a:xfrm>
+            <a:off x="1876151" y="3593958"/>
+            <a:ext cx="685800" cy="685800"/>
+            <a:chOff x="5692117" y="3251058"/>
+            <a:chExt cx="685800" cy="685800"/>
+          </a:xfrm>
+        </p:grpSpPr>
+        <p:sp>
+          <p:nvSpPr>
+            <p:cNvPr id="20" name="Pie 19"/>
+            <p:cNvSpPr/>
+            <p:nvPr/>
+          </p:nvSpPr>
+          <p:spPr>
+            <a:xfrm>
+              <a:off x="5692117" y="3251058"/>
+              <a:ext cx="685800" cy="685800"/>
+            </a:xfrm>
+            <a:prstGeom prst="pie">
+              <a:avLst>
+                <a:gd name="adj1" fmla="val 5438467"/>
+                <a:gd name="adj2" fmla="val 16200000"/>
+              </a:avLst>
+            </a:prstGeom>
+            <a:solidFill>
+              <a:srgbClr val="FF0000"/>
+            </a:solidFill>
+            <a:ln>
+              <a:noFill/>
+            </a:ln>
+            <a:effectLst/>
+          </p:spPr>
+          <p:style>
+            <a:lnRef idx="1">
+              <a:schemeClr val="accent1"/>
+            </a:lnRef>
+            <a:fillRef idx="3">
+              <a:schemeClr val="accent1"/>
+            </a:fillRef>
+            <a:effectRef idx="2">
+              <a:schemeClr val="accent1"/>
+            </a:effectRef>
+            <a:fontRef idx="minor">
+              <a:schemeClr val="lt1"/>
+            </a:fontRef>
+          </p:style>
+          <p:txBody>
+            <a:bodyPr rtlCol="0" anchor="ctr"/>
+            <a:lstStyle/>
+            <a:p>
+              <a:pPr algn="ctr"/>
+              <a:endParaRPr lang="en-US"/>
+            </a:p>
+          </p:txBody>
+        </p:sp>
+        <p:sp>
+          <p:nvSpPr>
+            <p:cNvPr id="21" name="Pie 20"/>
+            <p:cNvSpPr/>
+            <p:nvPr/>
+          </p:nvSpPr>
+          <p:spPr>
+            <a:xfrm>
+              <a:off x="5692117" y="3251058"/>
+              <a:ext cx="685800" cy="685800"/>
+            </a:xfrm>
+            <a:prstGeom prst="pie">
+              <a:avLst>
+                <a:gd name="adj1" fmla="val 16212808"/>
+                <a:gd name="adj2" fmla="val 5458127"/>
+              </a:avLst>
+            </a:prstGeom>
+            <a:solidFill>
+              <a:srgbClr val="800080"/>
+            </a:solidFill>
+            <a:ln>
+              <a:noFill/>
+            </a:ln>
+            <a:effectLst/>
+          </p:spPr>
+          <p:style>
+            <a:lnRef idx="1">
+              <a:schemeClr val="accent1"/>
+            </a:lnRef>
+            <a:fillRef idx="3">
+              <a:schemeClr val="accent1"/>
+            </a:fillRef>
+            <a:effectRef idx="2">
+              <a:schemeClr val="accent1"/>
+            </a:effectRef>
+            <a:fontRef idx="minor">
+              <a:schemeClr val="lt1"/>
+            </a:fontRef>
+          </p:style>
+          <p:txBody>
+            <a:bodyPr rtlCol="0" anchor="ctr"/>
+            <a:lstStyle/>
+            <a:p>
+              <a:pPr algn="ctr"/>
+              <a:endParaRPr lang="en-US">
+                <a:solidFill>
+                  <a:schemeClr val="tx1"/>
+                </a:solidFill>
+              </a:endParaRPr>
+            </a:p>
+          </p:txBody>
+        </p:sp>
+      </p:grpSp>
+      <p:grpSp>
+        <p:nvGrpSpPr>
+          <p:cNvPr id="26" name="Group 25"/>
+          <p:cNvGrpSpPr/>
+          <p:nvPr/>
+        </p:nvGrpSpPr>
+        <p:grpSpPr>
+          <a:xfrm>
+            <a:off x="2887998" y="2670282"/>
+            <a:ext cx="685800" cy="685800"/>
+            <a:chOff x="3558595" y="4187010"/>
+            <a:chExt cx="685800" cy="685800"/>
+          </a:xfrm>
+        </p:grpSpPr>
+        <p:sp>
+          <p:nvSpPr>
+            <p:cNvPr id="23" name="Pie 22"/>
+            <p:cNvSpPr/>
+            <p:nvPr/>
+          </p:nvSpPr>
+          <p:spPr>
+            <a:xfrm>
+              <a:off x="3558595" y="4187010"/>
+              <a:ext cx="685800" cy="685800"/>
+            </a:xfrm>
+            <a:prstGeom prst="pie">
+              <a:avLst>
+                <a:gd name="adj1" fmla="val 5438467"/>
+                <a:gd name="adj2" fmla="val 16200000"/>
+              </a:avLst>
+            </a:prstGeom>
+            <a:solidFill>
+              <a:srgbClr val="800080"/>
+            </a:solidFill>
+            <a:ln>
+              <a:noFill/>
+            </a:ln>
+            <a:effectLst/>
+          </p:spPr>
+          <p:style>
+            <a:lnRef idx="1">
+              <a:schemeClr val="accent1"/>
+            </a:lnRef>
+            <a:fillRef idx="3">
+              <a:schemeClr val="accent1"/>
+            </a:fillRef>
+            <a:effectRef idx="2">
+              <a:schemeClr val="accent1"/>
+            </a:effectRef>
+            <a:fontRef idx="minor">
+              <a:schemeClr val="lt1"/>
+            </a:fontRef>
+          </p:style>
+          <p:txBody>
+            <a:bodyPr rtlCol="0" anchor="ctr"/>
+            <a:lstStyle/>
+            <a:p>
+              <a:pPr algn="ctr"/>
+              <a:endParaRPr lang="en-US"/>
+            </a:p>
+          </p:txBody>
+        </p:sp>
+        <p:sp>
+          <p:nvSpPr>
+            <p:cNvPr id="24" name="Pie 23"/>
+            <p:cNvSpPr/>
+            <p:nvPr/>
+          </p:nvSpPr>
+          <p:spPr>
+            <a:xfrm>
+              <a:off x="3558595" y="4187010"/>
+              <a:ext cx="685800" cy="685800"/>
+            </a:xfrm>
+            <a:prstGeom prst="pie">
+              <a:avLst>
+                <a:gd name="adj1" fmla="val 16212808"/>
+                <a:gd name="adj2" fmla="val 5458127"/>
+              </a:avLst>
+            </a:prstGeom>
+            <a:solidFill>
+              <a:srgbClr val="0000FF"/>
+            </a:solidFill>
+            <a:ln>
+              <a:noFill/>
+            </a:ln>
+            <a:effectLst/>
+          </p:spPr>
+          <p:style>
+            <a:lnRef idx="1">
+              <a:schemeClr val="accent1"/>
+            </a:lnRef>
+            <a:fillRef idx="3">
+              <a:schemeClr val="accent1"/>
+            </a:fillRef>
+            <a:effectRef idx="2">
+              <a:schemeClr val="accent1"/>
+            </a:effectRef>
+            <a:fontRef idx="minor">
+              <a:schemeClr val="lt1"/>
+            </a:fontRef>
+          </p:style>
+          <p:txBody>
+            <a:bodyPr rtlCol="0" anchor="ctr"/>
+            <a:lstStyle/>
+            <a:p>
+              <a:pPr algn="ctr"/>
+              <a:endParaRPr lang="en-US">
+                <a:solidFill>
+                  <a:schemeClr val="tx1"/>
+                </a:solidFill>
+              </a:endParaRPr>
+            </a:p>
+          </p:txBody>
+        </p:sp>
+      </p:grpSp>
+      <p:grpSp>
+        <p:nvGrpSpPr>
+          <p:cNvPr id="29" name="Group 28"/>
+          <p:cNvGrpSpPr/>
+          <p:nvPr/>
+        </p:nvGrpSpPr>
+        <p:grpSpPr>
+          <a:xfrm>
+            <a:off x="2871618" y="3593958"/>
+            <a:ext cx="686977" cy="685800"/>
+            <a:chOff x="5690940" y="4109655"/>
+            <a:chExt cx="686977" cy="685800"/>
+          </a:xfrm>
+        </p:grpSpPr>
+        <p:sp>
+          <p:nvSpPr>
+            <p:cNvPr id="22" name="Pie 21"/>
+            <p:cNvSpPr/>
+            <p:nvPr/>
+          </p:nvSpPr>
+          <p:spPr>
+            <a:xfrm>
+              <a:off x="5692117" y="4109655"/>
+              <a:ext cx="685800" cy="685800"/>
+            </a:xfrm>
+            <a:prstGeom prst="pie">
+              <a:avLst>
+                <a:gd name="adj1" fmla="val 5438467"/>
+                <a:gd name="adj2" fmla="val 16200000"/>
+              </a:avLst>
+            </a:prstGeom>
+            <a:solidFill>
+              <a:srgbClr val="800080"/>
+            </a:solidFill>
+            <a:ln>
+              <a:noFill/>
+            </a:ln>
+            <a:effectLst/>
+          </p:spPr>
+          <p:style>
+            <a:lnRef idx="1">
+              <a:schemeClr val="accent1"/>
+            </a:lnRef>
+            <a:fillRef idx="3">
+              <a:schemeClr val="accent1"/>
+            </a:fillRef>
+            <a:effectRef idx="2">
+              <a:schemeClr val="accent1"/>
+            </a:effectRef>
+            <a:fontRef idx="minor">
+              <a:schemeClr val="lt1"/>
+            </a:fontRef>
+          </p:style>
+          <p:txBody>
+            <a:bodyPr rtlCol="0" anchor="ctr"/>
+            <a:lstStyle/>
+            <a:p>
+              <a:pPr algn="ctr"/>
+              <a:endParaRPr lang="en-US"/>
+            </a:p>
+          </p:txBody>
+        </p:sp>
+        <p:sp>
+          <p:nvSpPr>
+            <p:cNvPr id="25" name="Pie 24"/>
+            <p:cNvSpPr/>
+            <p:nvPr/>
+          </p:nvSpPr>
+          <p:spPr>
+            <a:xfrm>
+              <a:off x="5690940" y="4109655"/>
+              <a:ext cx="685800" cy="685800"/>
+            </a:xfrm>
+            <a:prstGeom prst="pie">
+              <a:avLst>
+                <a:gd name="adj1" fmla="val 16212808"/>
+                <a:gd name="adj2" fmla="val 5458127"/>
+              </a:avLst>
+            </a:prstGeom>
+            <a:solidFill>
+              <a:srgbClr val="FF0000"/>
+            </a:solidFill>
+            <a:ln>
+              <a:noFill/>
+            </a:ln>
+            <a:effectLst/>
+          </p:spPr>
+          <p:style>
+            <a:lnRef idx="1">
+              <a:schemeClr val="accent1"/>
+            </a:lnRef>
+            <a:fillRef idx="3">
+              <a:schemeClr val="accent1"/>
+            </a:fillRef>
+            <a:effectRef idx="2">
+              <a:schemeClr val="accent1"/>
+            </a:effectRef>
+            <a:fontRef idx="minor">
+              <a:schemeClr val="lt1"/>
+            </a:fontRef>
+          </p:style>
+          <p:txBody>
+            <a:bodyPr rtlCol="0" anchor="ctr"/>
+            <a:lstStyle/>
+            <a:p>
+              <a:pPr algn="ctr"/>
+              <a:endParaRPr lang="en-US">
+                <a:solidFill>
+                  <a:schemeClr val="tx1"/>
+                </a:solidFill>
+              </a:endParaRPr>
+            </a:p>
+          </p:txBody>
+        </p:sp>
+      </p:grpSp>
     </p:spTree>
     <p:extLst>
       <p:ext uri="{BB962C8B-B14F-4D97-AF65-F5344CB8AC3E}">

</xml_diff>